<commit_message>
Final presentation slides uploaded before the due date
</commit_message>
<xml_diff>
--- a/Session 8 Project 1 EDA Alex Salamah Hao Wang v3.pptx
+++ b/Session 8 Project 1 EDA Alex Salamah Hao Wang v3.pptx
@@ -20,9 +20,9 @@
     <p:sldId id="767" r:id="rId11"/>
     <p:sldId id="765" r:id="rId12"/>
     <p:sldId id="768" r:id="rId13"/>
-    <p:sldId id="770" r:id="rId14"/>
-    <p:sldId id="759" r:id="rId15"/>
-    <p:sldId id="772" r:id="rId16"/>
+    <p:sldId id="759" r:id="rId14"/>
+    <p:sldId id="772" r:id="rId15"/>
+    <p:sldId id="774" r:id="rId16"/>
   </p:sldIdLst>
   <p:sldSz cx="9144000" cy="6858000" type="screen4x3"/>
   <p:notesSz cx="6858000" cy="9144000"/>
@@ -10352,269 +10352,6 @@
         </p:nvSpPr>
         <p:spPr>
           <a:xfrm>
-            <a:off x="0" y="52388"/>
-            <a:ext cx="9144000" cy="892175"/>
-          </a:xfrm>
-        </p:spPr>
-        <p:txBody>
-          <a:bodyPr anchor="t">
-            <a:noAutofit/>
-          </a:bodyPr>
-          <a:lstStyle/>
-          <a:p>
-            <a:r>
-              <a:rPr lang="en-US" sz="3200" dirty="0">
-                <a:latin typeface="Tw Cen MT" panose="020B0602020104020603" pitchFamily="34" charset="0"/>
-              </a:rPr>
-              <a:t>RELATIONSHIP ABV v. IBU</a:t>
-            </a:r>
-            <a:endParaRPr lang="en-US" sz="2000" dirty="0">
-              <a:latin typeface="Tw Cen MT" panose="020B0602020104020603" pitchFamily="34" charset="0"/>
-            </a:endParaRPr>
-          </a:p>
-        </p:txBody>
-      </p:sp>
-      <p:pic>
-        <p:nvPicPr>
-          <p:cNvPr id="4" name="Picture 3" descr="A picture containing table, cup, sitting, glass&#10;&#10;Description automatically generated">
-            <a:extLst>
-              <a:ext uri="{FF2B5EF4-FFF2-40B4-BE49-F238E27FC236}">
-                <a16:creationId xmlns:a16="http://schemas.microsoft.com/office/drawing/2014/main" id="{0F202128-EC7D-4710-A3C1-7EFED35E993A}"/>
-              </a:ext>
-            </a:extLst>
-          </p:cNvPr>
-          <p:cNvPicPr>
-            <a:picLocks noChangeAspect="1"/>
-          </p:cNvPicPr>
-          <p:nvPr/>
-        </p:nvPicPr>
-        <p:blipFill>
-          <a:blip r:embed="rId3" cstate="print">
-            <a:extLst>
-              <a:ext uri="{28A0092B-C50C-407E-A947-70E740481C1C}">
-                <a14:useLocalDpi xmlns:a14="http://schemas.microsoft.com/office/drawing/2010/main" val="0"/>
-              </a:ext>
-              <a:ext uri="{837473B0-CC2E-450A-ABE3-18F120FF3D39}">
-                <a1611:picAttrSrcUrl xmlns:a1611="http://schemas.microsoft.com/office/drawing/2016/11/main" r:id="rId4"/>
-              </a:ext>
-            </a:extLst>
-          </a:blip>
-          <a:stretch>
-            <a:fillRect/>
-          </a:stretch>
-        </p:blipFill>
-        <p:spPr>
-          <a:xfrm>
-            <a:off x="7924800" y="-2748"/>
-            <a:ext cx="1219200" cy="762851"/>
-          </a:xfrm>
-          <a:prstGeom prst="rect">
-            <a:avLst/>
-          </a:prstGeom>
-        </p:spPr>
-      </p:pic>
-      <p:sp>
-        <p:nvSpPr>
-          <p:cNvPr id="6" name="TextBox 5">
-            <a:extLst>
-              <a:ext uri="{FF2B5EF4-FFF2-40B4-BE49-F238E27FC236}">
-                <a16:creationId xmlns:a16="http://schemas.microsoft.com/office/drawing/2014/main" id="{D561F14C-0270-4502-802D-53713778EFFE}"/>
-              </a:ext>
-            </a:extLst>
-          </p:cNvPr>
-          <p:cNvSpPr txBox="1"/>
-          <p:nvPr/>
-        </p:nvSpPr>
-        <p:spPr>
-          <a:xfrm>
-            <a:off x="914400" y="1085484"/>
-            <a:ext cx="8153399" cy="584775"/>
-          </a:xfrm>
-          <a:prstGeom prst="rect">
-            <a:avLst/>
-          </a:prstGeom>
-          <a:noFill/>
-        </p:spPr>
-        <p:txBody>
-          <a:bodyPr wrap="square" rtlCol="0">
-            <a:spAutoFit/>
-          </a:bodyPr>
-          <a:lstStyle/>
-          <a:p>
-            <a:r>
-              <a:rPr lang="en-US" sz="1600" dirty="0"/>
-              <a:t>GGPairs Plot below shows a strong correlation between ABV and IBU across all styles of beers.  The strongest correlation is in other beer style category at 0.787 followed by IPA at 0.689.</a:t>
-            </a:r>
-          </a:p>
-        </p:txBody>
-      </p:sp>
-      <p:cxnSp>
-        <p:nvCxnSpPr>
-          <p:cNvPr id="7" name="Straight Connector 6">
-            <a:extLst>
-              <a:ext uri="{FF2B5EF4-FFF2-40B4-BE49-F238E27FC236}">
-                <a16:creationId xmlns:a16="http://schemas.microsoft.com/office/drawing/2014/main" id="{22073CA9-BA6B-4A76-84F7-8EE79D6C8E9E}"/>
-              </a:ext>
-            </a:extLst>
-          </p:cNvPr>
-          <p:cNvCxnSpPr>
-            <a:cxnSpLocks/>
-          </p:cNvCxnSpPr>
-          <p:nvPr/>
-        </p:nvCxnSpPr>
-        <p:spPr>
-          <a:xfrm flipV="1">
-            <a:off x="0" y="944563"/>
-            <a:ext cx="9144000" cy="2"/>
-          </a:xfrm>
-          <a:prstGeom prst="line">
-            <a:avLst/>
-          </a:prstGeom>
-          <a:ln w="19050" cmpd="dbl">
-            <a:solidFill>
-              <a:schemeClr val="tx1"/>
-            </a:solidFill>
-          </a:ln>
-        </p:spPr>
-        <p:style>
-          <a:lnRef idx="1">
-            <a:schemeClr val="accent1"/>
-          </a:lnRef>
-          <a:fillRef idx="0">
-            <a:schemeClr val="accent1"/>
-          </a:fillRef>
-          <a:effectRef idx="0">
-            <a:schemeClr val="accent1"/>
-          </a:effectRef>
-          <a:fontRef idx="minor">
-            <a:schemeClr val="tx1"/>
-          </a:fontRef>
-        </p:style>
-      </p:cxnSp>
-      <p:pic>
-        <p:nvPicPr>
-          <p:cNvPr id="3" name="Picture 2">
-            <a:extLst>
-              <a:ext uri="{FF2B5EF4-FFF2-40B4-BE49-F238E27FC236}">
-                <a16:creationId xmlns:a16="http://schemas.microsoft.com/office/drawing/2014/main" id="{CA99434D-2CC2-40B8-805F-843BEFD60D8B}"/>
-              </a:ext>
-            </a:extLst>
-          </p:cNvPr>
-          <p:cNvPicPr>
-            <a:picLocks noChangeAspect="1"/>
-          </p:cNvPicPr>
-          <p:nvPr/>
-        </p:nvPicPr>
-        <p:blipFill>
-          <a:blip r:embed="rId5"/>
-          <a:stretch>
-            <a:fillRect/>
-          </a:stretch>
-        </p:blipFill>
-        <p:spPr>
-          <a:xfrm>
-            <a:off x="838200" y="2272144"/>
-            <a:ext cx="8077200" cy="3342290"/>
-          </a:xfrm>
-          <a:prstGeom prst="rect">
-            <a:avLst/>
-          </a:prstGeom>
-          <a:ln w="88900" cap="sq" cmpd="thickThin">
-            <a:solidFill>
-              <a:srgbClr val="000000"/>
-            </a:solidFill>
-            <a:prstDash val="solid"/>
-            <a:miter lim="800000"/>
-          </a:ln>
-          <a:effectLst>
-            <a:innerShdw blurRad="76200">
-              <a:srgbClr val="000000"/>
-            </a:innerShdw>
-          </a:effectLst>
-        </p:spPr>
-      </p:pic>
-    </p:spTree>
-    <p:extLst>
-      <p:ext uri="{BB962C8B-B14F-4D97-AF65-F5344CB8AC3E}">
-        <p14:creationId xmlns:p14="http://schemas.microsoft.com/office/powerpoint/2010/main" val="548399573"/>
-      </p:ext>
-    </p:extLst>
-  </p:cSld>
-  <p:clrMapOvr>
-    <a:overrideClrMapping bg1="lt1" tx1="dk1" bg2="lt2" tx2="dk2" accent1="accent1" accent2="accent2" accent3="accent3" accent4="accent4" accent5="accent5" accent6="accent6" hlink="hlink" folHlink="folHlink"/>
-  </p:clrMapOvr>
-</p:sld>
-</file>
-
-<file path=ppt/slides/slide13.xml><?xml version="1.0" encoding="utf-8"?>
-<p:sld xmlns:a="http://schemas.openxmlformats.org/drawingml/2006/main" xmlns:r="http://schemas.openxmlformats.org/officeDocument/2006/relationships" xmlns:p="http://schemas.openxmlformats.org/presentationml/2006/main">
-  <p:cSld>
-    <p:bg>
-      <p:bgPr>
-        <a:gradFill>
-          <a:gsLst>
-            <a:gs pos="0">
-              <a:schemeClr val="accent4">
-                <a:lumMod val="5000"/>
-                <a:lumOff val="95000"/>
-              </a:schemeClr>
-            </a:gs>
-            <a:gs pos="100000">
-              <a:schemeClr val="accent4">
-                <a:lumMod val="45000"/>
-                <a:lumOff val="55000"/>
-              </a:schemeClr>
-            </a:gs>
-            <a:gs pos="90000">
-              <a:schemeClr val="accent4">
-                <a:lumMod val="45000"/>
-                <a:lumOff val="55000"/>
-              </a:schemeClr>
-            </a:gs>
-            <a:gs pos="100000">
-              <a:schemeClr val="accent4">
-                <a:lumMod val="30000"/>
-                <a:lumOff val="70000"/>
-              </a:schemeClr>
-            </a:gs>
-          </a:gsLst>
-          <a:lin ang="5400000" scaled="1"/>
-        </a:gradFill>
-        <a:effectLst/>
-      </p:bgPr>
-    </p:bg>
-    <p:spTree>
-      <p:nvGrpSpPr>
-        <p:cNvPr id="1" name=""/>
-        <p:cNvGrpSpPr/>
-        <p:nvPr/>
-      </p:nvGrpSpPr>
-      <p:grpSpPr>
-        <a:xfrm>
-          <a:off x="0" y="0"/>
-          <a:ext cx="0" cy="0"/>
-          <a:chOff x="0" y="0"/>
-          <a:chExt cx="0" cy="0"/>
-        </a:xfrm>
-      </p:grpSpPr>
-      <p:sp>
-        <p:nvSpPr>
-          <p:cNvPr id="5" name="Title 1">
-            <a:extLst>
-              <a:ext uri="{FF2B5EF4-FFF2-40B4-BE49-F238E27FC236}">
-                <a16:creationId xmlns:a16="http://schemas.microsoft.com/office/drawing/2014/main" id="{FD7ED2C4-3A23-459A-92D9-FE9223E97491}"/>
-              </a:ext>
-            </a:extLst>
-          </p:cNvPr>
-          <p:cNvSpPr>
-            <a:spLocks noGrp="1"/>
-          </p:cNvSpPr>
-          <p:nvPr>
-            <p:ph type="title" idx="4294967295"/>
-          </p:nvPr>
-        </p:nvSpPr>
-        <p:spPr>
-          <a:xfrm>
             <a:off x="0" y="-12700"/>
             <a:ext cx="9144000" cy="908050"/>
           </a:xfrm>
@@ -11087,7 +10824,7 @@
 </p:sld>
 </file>
 
-<file path=ppt/slides/slide14.xml><?xml version="1.0" encoding="utf-8"?>
+<file path=ppt/slides/slide13.xml><?xml version="1.0" encoding="utf-8"?>
 <p:sld xmlns:a="http://schemas.openxmlformats.org/drawingml/2006/main" xmlns:r="http://schemas.openxmlformats.org/officeDocument/2006/relationships" xmlns:p="http://schemas.openxmlformats.org/presentationml/2006/main">
   <p:cSld>
     <p:bg>
@@ -11539,7 +11276,7 @@
                 </a:solidFill>
                 <a:latin typeface="Tw Cen MT" panose="020B0602020104020603"/>
               </a:rPr>
-              <a:t>Figure 2 Alcohol Abuse by State Geo-positional Map</a:t>
+              <a:t>Figure 3 Alcohol Abuse by State Geo-positional Map</a:t>
             </a:r>
           </a:p>
         </p:txBody>
@@ -11624,6 +11361,78 @@
   </p:cSld>
   <p:clrMapOvr>
     <a:overrideClrMapping bg1="lt1" tx1="dk1" bg2="lt2" tx2="dk2" accent1="accent1" accent2="accent2" accent3="accent3" accent4="accent4" accent5="accent5" accent6="accent6" hlink="hlink" folHlink="folHlink"/>
+  </p:clrMapOvr>
+</p:sld>
+</file>
+
+<file path=ppt/slides/slide14.xml><?xml version="1.0" encoding="utf-8"?>
+<p:sld xmlns:a="http://schemas.openxmlformats.org/drawingml/2006/main" xmlns:r="http://schemas.openxmlformats.org/officeDocument/2006/relationships" xmlns:p="http://schemas.openxmlformats.org/presentationml/2006/main">
+  <p:cSld>
+    <p:spTree>
+      <p:nvGrpSpPr>
+        <p:cNvPr id="1" name=""/>
+        <p:cNvGrpSpPr/>
+        <p:nvPr/>
+      </p:nvGrpSpPr>
+      <p:grpSpPr>
+        <a:xfrm>
+          <a:off x="0" y="0"/>
+          <a:ext cx="0" cy="0"/>
+          <a:chOff x="0" y="0"/>
+          <a:chExt cx="0" cy="0"/>
+        </a:xfrm>
+      </p:grpSpPr>
+      <p:sp>
+        <p:nvSpPr>
+          <p:cNvPr id="2" name="TextBox 1">
+            <a:extLst>
+              <a:ext uri="{FF2B5EF4-FFF2-40B4-BE49-F238E27FC236}">
+                <a16:creationId xmlns:a16="http://schemas.microsoft.com/office/drawing/2014/main" id="{973932BA-3562-4DBA-A9E4-3FC86C99B5D3}"/>
+              </a:ext>
+            </a:extLst>
+          </p:cNvPr>
+          <p:cNvSpPr txBox="1"/>
+          <p:nvPr/>
+        </p:nvSpPr>
+        <p:spPr>
+          <a:xfrm>
+            <a:off x="2667000" y="2286000"/>
+            <a:ext cx="4810997" cy="369332"/>
+          </a:xfrm>
+          <a:prstGeom prst="rect">
+            <a:avLst/>
+          </a:prstGeom>
+          <a:noFill/>
+        </p:spPr>
+        <p:txBody>
+          <a:bodyPr wrap="none" rtlCol="0">
+            <a:spAutoFit/>
+          </a:bodyPr>
+          <a:lstStyle/>
+          <a:p>
+            <a:r>
+              <a:rPr lang="en-US" dirty="0"/>
+              <a:t>YouTube video: </a:t>
+            </a:r>
+            <a:r>
+              <a:rPr lang="en-US" dirty="0">
+                <a:hlinkClick r:id="rId2"/>
+              </a:rPr>
+              <a:t>https://youtu.be/DVeZcpDTUmE</a:t>
+            </a:r>
+            <a:endParaRPr lang="en-US" dirty="0"/>
+          </a:p>
+        </p:txBody>
+      </p:sp>
+    </p:spTree>
+    <p:extLst>
+      <p:ext uri="{BB962C8B-B14F-4D97-AF65-F5344CB8AC3E}">
+        <p14:creationId xmlns:p14="http://schemas.microsoft.com/office/powerpoint/2010/main" val="2698805459"/>
+      </p:ext>
+    </p:extLst>
+  </p:cSld>
+  <p:clrMapOvr>
+    <a:masterClrMapping/>
   </p:clrMapOvr>
 </p:sld>
 </file>
@@ -14129,98 +13938,514 @@
           </p:txBody>
         </p:sp>
       </p:grpSp>
-      <p:grpSp>
-        <p:nvGrpSpPr>
-          <p:cNvPr id="30" name="Group 29">
+      <p:sp>
+        <p:nvSpPr>
+          <p:cNvPr id="20" name="Rectangle 1">
             <a:extLst>
               <a:ext uri="{FF2B5EF4-FFF2-40B4-BE49-F238E27FC236}">
-                <a16:creationId xmlns:a16="http://schemas.microsoft.com/office/drawing/2014/main" id="{F10C8FCB-B60A-439B-BB31-28DC5A6459F6}"/>
+                <a16:creationId xmlns:a16="http://schemas.microsoft.com/office/drawing/2014/main" id="{CE35E50B-7DF9-42E8-9ADC-4E604CC9BCE8}"/>
               </a:ext>
             </a:extLst>
           </p:cNvPr>
-          <p:cNvGrpSpPr/>
+          <p:cNvSpPr>
+            <a:spLocks noChangeArrowheads="1"/>
+          </p:cNvSpPr>
           <p:nvPr/>
-        </p:nvGrpSpPr>
-        <p:grpSpPr>
-          <a:xfrm>
-            <a:off x="4581823" y="5725385"/>
-            <a:ext cx="4523776" cy="1123824"/>
-            <a:chOff x="4628056" y="3026358"/>
-            <a:chExt cx="4523776" cy="1123824"/>
-          </a:xfrm>
-        </p:grpSpPr>
-        <p:pic>
-          <p:nvPicPr>
-            <p:cNvPr id="31" name="Picture 30">
-              <a:extLst>
-                <a:ext uri="{FF2B5EF4-FFF2-40B4-BE49-F238E27FC236}">
-                  <a16:creationId xmlns:a16="http://schemas.microsoft.com/office/drawing/2014/main" id="{9688561C-8598-479F-B7A7-9EA3F019C647}"/>
-                </a:ext>
-              </a:extLst>
-            </p:cNvPr>
-            <p:cNvPicPr>
-              <a:picLocks noChangeAspect="1"/>
-            </p:cNvPicPr>
-            <p:nvPr/>
-          </p:nvPicPr>
-          <p:blipFill>
-            <a:blip r:embed="rId9"/>
-            <a:stretch>
-              <a:fillRect/>
-            </a:stretch>
-          </p:blipFill>
-          <p:spPr>
-            <a:xfrm>
-              <a:off x="4628056" y="3026358"/>
-              <a:ext cx="4523776" cy="891046"/>
-            </a:xfrm>
-            <a:prstGeom prst="rect">
+        </p:nvSpPr>
+        <p:spPr bwMode="auto">
+          <a:xfrm>
+            <a:off x="4543424" y="5823155"/>
+            <a:ext cx="2181822" cy="646331"/>
+          </a:xfrm>
+          <a:prstGeom prst="rect">
+            <a:avLst/>
+          </a:prstGeom>
+          <a:gradFill>
+            <a:gsLst>
+              <a:gs pos="100000">
+                <a:schemeClr val="bg1">
+                  <a:lumMod val="75000"/>
+                </a:schemeClr>
+              </a:gs>
+              <a:gs pos="23000">
+                <a:schemeClr val="bg1">
+                  <a:lumMod val="85000"/>
+                </a:schemeClr>
+              </a:gs>
+            </a:gsLst>
+            <a:lin ang="5400000" scaled="1"/>
+          </a:gradFill>
+          <a:ln>
+            <a:noFill/>
+          </a:ln>
+          <a:effectLst/>
+        </p:spPr>
+        <p:txBody>
+          <a:bodyPr vert="horz" wrap="square" lIns="0" tIns="0" rIns="0" bIns="0" numCol="1" anchor="ctr" anchorCtr="0" compatLnSpc="1">
+            <a:prstTxWarp prst="textNoShape">
               <a:avLst/>
-            </a:prstGeom>
-          </p:spPr>
-        </p:pic>
-        <p:sp>
-          <p:nvSpPr>
-            <p:cNvPr id="32" name="TextBox 31">
-              <a:extLst>
-                <a:ext uri="{FF2B5EF4-FFF2-40B4-BE49-F238E27FC236}">
-                  <a16:creationId xmlns:a16="http://schemas.microsoft.com/office/drawing/2014/main" id="{D8F66291-C3CE-45CC-8CC2-AFD7D6D5C3D0}"/>
-                </a:ext>
-              </a:extLst>
-            </p:cNvPr>
-            <p:cNvSpPr txBox="1"/>
-            <p:nvPr/>
-          </p:nvSpPr>
-          <p:spPr>
-            <a:xfrm>
-              <a:off x="4668257" y="3888572"/>
-              <a:ext cx="4323343" cy="261610"/>
-            </a:xfrm>
-            <a:prstGeom prst="rect">
+            </a:prstTxWarp>
+            <a:spAutoFit/>
+          </a:bodyPr>
+          <a:lstStyle/>
+          <a:p>
+            <a:pPr marR="0" lvl="0" algn="l" defTabSz="914400" rtl="0" eaLnBrk="0" fontAlgn="base" latinLnBrk="0" hangingPunct="0">
+              <a:lnSpc>
+                <a:spcPct val="100000"/>
+              </a:lnSpc>
+              <a:spcBef>
+                <a:spcPct val="0"/>
+              </a:spcBef>
+              <a:spcAft>
+                <a:spcPct val="0"/>
+              </a:spcAft>
+              <a:buClrTx/>
+              <a:buSzTx/>
+              <a:tabLst/>
+            </a:pPr>
+            <a:r>
+              <a:rPr kumimoji="0" lang="en-US" altLang="en-US" sz="700" b="0" i="0" u="none" strike="noStrike" cap="none" normalizeH="0" baseline="0" dirty="0">
+                <a:ln>
+                  <a:noFill/>
+                </a:ln>
+                <a:effectLst/>
+                <a:latin typeface="Lucida Console" panose="020B0609040504020204" pitchFamily="49" charset="0"/>
+              </a:rPr>
+              <a:t># Original data excluding NA’s:</a:t>
+            </a:r>
+          </a:p>
+          <a:p>
+            <a:pPr marR="0" lvl="0" algn="l" defTabSz="914400" rtl="0" eaLnBrk="0" fontAlgn="base" latinLnBrk="0" hangingPunct="0">
+              <a:lnSpc>
+                <a:spcPct val="100000"/>
+              </a:lnSpc>
+              <a:spcBef>
+                <a:spcPct val="0"/>
+              </a:spcBef>
+              <a:spcAft>
+                <a:spcPct val="0"/>
+              </a:spcAft>
+              <a:buClrTx/>
+              <a:buSzTx/>
+              <a:tabLst/>
+            </a:pPr>
+            <a:r>
+              <a:rPr kumimoji="0" lang="en-US" altLang="en-US" sz="700" b="0" i="0" u="none" strike="noStrike" cap="none" normalizeH="0" baseline="0" dirty="0">
+                <a:ln>
+                  <a:noFill/>
+                </a:ln>
+                <a:effectLst/>
+                <a:latin typeface="Lucida Console" panose="020B0609040504020204" pitchFamily="49" charset="0"/>
+              </a:rPr>
+              <a:t>Pearson's product-moment correlation</a:t>
+            </a:r>
+          </a:p>
+          <a:p>
+            <a:pPr marR="0" lvl="0" algn="l" defTabSz="914400" rtl="0" eaLnBrk="0" fontAlgn="base" latinLnBrk="0" hangingPunct="0">
+              <a:lnSpc>
+                <a:spcPct val="100000"/>
+              </a:lnSpc>
+              <a:spcBef>
+                <a:spcPct val="0"/>
+              </a:spcBef>
+              <a:spcAft>
+                <a:spcPct val="0"/>
+              </a:spcAft>
+              <a:buClrTx/>
+              <a:buSzTx/>
+              <a:tabLst/>
+            </a:pPr>
+            <a:r>
+              <a:rPr kumimoji="0" lang="en-US" altLang="en-US" sz="700" b="0" i="0" u="none" strike="noStrike" cap="none" normalizeH="0" baseline="0" dirty="0">
+                <a:ln>
+                  <a:noFill/>
+                </a:ln>
+                <a:effectLst/>
+                <a:latin typeface="Lucida Console" panose="020B0609040504020204" pitchFamily="49" charset="0"/>
+              </a:rPr>
+              <a:t>t = 33.863, df = 1403, p-value &lt; 2.2e-16</a:t>
+            </a:r>
+          </a:p>
+          <a:p>
+            <a:pPr marR="0" lvl="0" algn="l" defTabSz="914400" rtl="0" eaLnBrk="0" fontAlgn="base" latinLnBrk="0" hangingPunct="0">
+              <a:lnSpc>
+                <a:spcPct val="100000"/>
+              </a:lnSpc>
+              <a:spcBef>
+                <a:spcPct val="0"/>
+              </a:spcBef>
+              <a:spcAft>
+                <a:spcPct val="0"/>
+              </a:spcAft>
+              <a:buClrTx/>
+              <a:buSzTx/>
+              <a:tabLst/>
+            </a:pPr>
+            <a:r>
+              <a:rPr kumimoji="0" lang="en-US" altLang="en-US" sz="700" b="0" i="0" u="none" strike="noStrike" cap="none" normalizeH="0" baseline="0" dirty="0">
+                <a:ln>
+                  <a:noFill/>
+                </a:ln>
+                <a:effectLst/>
+                <a:latin typeface="Lucida Console" panose="020B0609040504020204" pitchFamily="49" charset="0"/>
+              </a:rPr>
+              <a:t>95 percent confidence interval:0.6407982 0.6984238</a:t>
+            </a:r>
+          </a:p>
+          <a:p>
+            <a:pPr marR="0" lvl="0" algn="l" defTabSz="914400" rtl="0" eaLnBrk="0" fontAlgn="base" latinLnBrk="0" hangingPunct="0">
+              <a:lnSpc>
+                <a:spcPct val="100000"/>
+              </a:lnSpc>
+              <a:spcBef>
+                <a:spcPct val="0"/>
+              </a:spcBef>
+              <a:spcAft>
+                <a:spcPct val="0"/>
+              </a:spcAft>
+              <a:buClrTx/>
+              <a:buSzTx/>
+              <a:tabLst/>
+            </a:pPr>
+            <a:r>
+              <a:rPr kumimoji="0" lang="en-US" altLang="en-US" sz="700" b="0" i="0" u="none" strike="noStrike" cap="none" normalizeH="0" baseline="0" dirty="0">
+                <a:ln>
+                  <a:noFill/>
+                </a:ln>
+                <a:effectLst/>
+                <a:latin typeface="Lucida Console" panose="020B0609040504020204" pitchFamily="49" charset="0"/>
+              </a:rPr>
+              <a:t>sample estimates: cor 0.6706215</a:t>
+            </a:r>
+          </a:p>
+        </p:txBody>
+      </p:sp>
+      <p:sp>
+        <p:nvSpPr>
+          <p:cNvPr id="21" name="Rectangle 1">
+            <a:extLst>
+              <a:ext uri="{FF2B5EF4-FFF2-40B4-BE49-F238E27FC236}">
+                <a16:creationId xmlns:a16="http://schemas.microsoft.com/office/drawing/2014/main" id="{C1E6649D-3F33-4CAC-937B-CA909B083790}"/>
+              </a:ext>
+            </a:extLst>
+          </p:cNvPr>
+          <p:cNvSpPr>
+            <a:spLocks noChangeArrowheads="1"/>
+          </p:cNvSpPr>
+          <p:nvPr/>
+        </p:nvSpPr>
+        <p:spPr bwMode="auto">
+          <a:xfrm>
+            <a:off x="6857634" y="5823155"/>
+            <a:ext cx="2181822" cy="646331"/>
+          </a:xfrm>
+          <a:prstGeom prst="rect">
+            <a:avLst/>
+          </a:prstGeom>
+          <a:gradFill>
+            <a:gsLst>
+              <a:gs pos="100000">
+                <a:schemeClr val="bg1">
+                  <a:lumMod val="75000"/>
+                </a:schemeClr>
+              </a:gs>
+              <a:gs pos="23000">
+                <a:schemeClr val="bg1">
+                  <a:lumMod val="85000"/>
+                </a:schemeClr>
+              </a:gs>
+            </a:gsLst>
+            <a:lin ang="5400000" scaled="1"/>
+          </a:gradFill>
+          <a:ln>
+            <a:noFill/>
+          </a:ln>
+          <a:effectLst/>
+        </p:spPr>
+        <p:txBody>
+          <a:bodyPr vert="horz" wrap="square" lIns="0" tIns="0" rIns="0" bIns="0" numCol="1" anchor="ctr" anchorCtr="0" compatLnSpc="1">
+            <a:prstTxWarp prst="textNoShape">
               <a:avLst/>
-            </a:prstGeom>
-            <a:noFill/>
-          </p:spPr>
-          <p:txBody>
-            <a:bodyPr wrap="square" rtlCol="0">
-              <a:spAutoFit/>
-            </a:bodyPr>
-            <a:lstStyle/>
-            <a:p>
-              <a:pPr algn="ctr" defTabSz="457200"/>
-              <a:r>
-                <a:rPr lang="en-US" sz="1100" dirty="0">
-                  <a:solidFill>
-                    <a:prstClr val="black"/>
-                  </a:solidFill>
-                  <a:latin typeface="Tw Cen MT" panose="020B0602020104020603"/>
-                </a:rPr>
-                <a:t>Figure 4 </a:t>
-              </a:r>
-            </a:p>
-          </p:txBody>
-        </p:sp>
-      </p:grpSp>
+            </a:prstTxWarp>
+            <a:spAutoFit/>
+          </a:bodyPr>
+          <a:lstStyle/>
+          <a:p>
+            <a:pPr marR="0" lvl="0" algn="l" defTabSz="914400" rtl="0" eaLnBrk="0" fontAlgn="base" latinLnBrk="0" hangingPunct="0">
+              <a:lnSpc>
+                <a:spcPct val="100000"/>
+              </a:lnSpc>
+              <a:spcBef>
+                <a:spcPct val="0"/>
+              </a:spcBef>
+              <a:spcAft>
+                <a:spcPct val="0"/>
+              </a:spcAft>
+              <a:buClrTx/>
+              <a:buSzTx/>
+              <a:tabLst/>
+            </a:pPr>
+            <a:r>
+              <a:rPr kumimoji="0" lang="en-US" altLang="en-US" sz="700" b="0" i="0" u="none" strike="noStrike" cap="none" normalizeH="0" baseline="0" dirty="0">
+                <a:ln>
+                  <a:noFill/>
+                </a:ln>
+                <a:effectLst/>
+                <a:latin typeface="Lucida Console" panose="020B0609040504020204" pitchFamily="49" charset="0"/>
+              </a:rPr>
+              <a:t># Final data without NA’s:</a:t>
+            </a:r>
+          </a:p>
+          <a:p>
+            <a:pPr marR="0" lvl="0" algn="l" defTabSz="914400" rtl="0" eaLnBrk="0" fontAlgn="base" latinLnBrk="0" hangingPunct="0">
+              <a:lnSpc>
+                <a:spcPct val="100000"/>
+              </a:lnSpc>
+              <a:spcBef>
+                <a:spcPct val="0"/>
+              </a:spcBef>
+              <a:spcAft>
+                <a:spcPct val="0"/>
+              </a:spcAft>
+              <a:buClrTx/>
+              <a:buSzTx/>
+              <a:tabLst/>
+            </a:pPr>
+            <a:r>
+              <a:rPr kumimoji="0" lang="en-US" altLang="en-US" sz="700" b="0" i="0" u="none" strike="noStrike" cap="none" normalizeH="0" baseline="0" dirty="0">
+                <a:ln>
+                  <a:noFill/>
+                </a:ln>
+                <a:effectLst/>
+                <a:latin typeface="Lucida Console" panose="020B0609040504020204" pitchFamily="49" charset="0"/>
+              </a:rPr>
+              <a:t>Pearson's product-moment correlation</a:t>
+            </a:r>
+          </a:p>
+          <a:p>
+            <a:pPr marR="0" lvl="0" algn="l" defTabSz="914400" rtl="0" eaLnBrk="0" fontAlgn="base" latinLnBrk="0" hangingPunct="0">
+              <a:lnSpc>
+                <a:spcPct val="100000"/>
+              </a:lnSpc>
+              <a:spcBef>
+                <a:spcPct val="0"/>
+              </a:spcBef>
+              <a:spcAft>
+                <a:spcPct val="0"/>
+              </a:spcAft>
+              <a:buClrTx/>
+              <a:buSzTx/>
+              <a:tabLst/>
+            </a:pPr>
+            <a:r>
+              <a:rPr kumimoji="0" lang="en-US" altLang="en-US" sz="700" b="0" i="0" u="none" strike="noStrike" cap="none" normalizeH="0" baseline="0" dirty="0">
+                <a:ln>
+                  <a:noFill/>
+                </a:ln>
+                <a:effectLst/>
+                <a:latin typeface="Lucida Console" panose="020B0609040504020204" pitchFamily="49" charset="0"/>
+              </a:rPr>
+              <a:t>t = 57.005, df = 2408, p-value &lt; 2.2e-16</a:t>
+            </a:r>
+          </a:p>
+          <a:p>
+            <a:pPr marR="0" lvl="0" algn="l" defTabSz="914400" rtl="0" eaLnBrk="0" fontAlgn="base" latinLnBrk="0" hangingPunct="0">
+              <a:lnSpc>
+                <a:spcPct val="100000"/>
+              </a:lnSpc>
+              <a:spcBef>
+                <a:spcPct val="0"/>
+              </a:spcBef>
+              <a:spcAft>
+                <a:spcPct val="0"/>
+              </a:spcAft>
+              <a:buClrTx/>
+              <a:buSzTx/>
+              <a:tabLst/>
+            </a:pPr>
+            <a:r>
+              <a:rPr kumimoji="0" lang="en-US" altLang="en-US" sz="700" b="0" i="0" u="none" strike="noStrike" cap="none" normalizeH="0" baseline="0" dirty="0">
+                <a:ln>
+                  <a:noFill/>
+                </a:ln>
+                <a:effectLst/>
+                <a:latin typeface="Lucida Console" panose="020B0609040504020204" pitchFamily="49" charset="0"/>
+              </a:rPr>
+              <a:t>95 percent confidence interval:0.7403535 0.7743731</a:t>
+            </a:r>
+          </a:p>
+          <a:p>
+            <a:pPr marR="0" lvl="0" algn="l" defTabSz="914400" rtl="0" eaLnBrk="0" fontAlgn="base" latinLnBrk="0" hangingPunct="0">
+              <a:lnSpc>
+                <a:spcPct val="100000"/>
+              </a:lnSpc>
+              <a:spcBef>
+                <a:spcPct val="0"/>
+              </a:spcBef>
+              <a:spcAft>
+                <a:spcPct val="0"/>
+              </a:spcAft>
+              <a:buClrTx/>
+              <a:buSzTx/>
+              <a:tabLst/>
+            </a:pPr>
+            <a:r>
+              <a:rPr kumimoji="0" lang="en-US" altLang="en-US" sz="700" b="0" i="0" u="none" strike="noStrike" cap="none" normalizeH="0" baseline="0" dirty="0">
+                <a:ln>
+                  <a:noFill/>
+                </a:ln>
+                <a:effectLst/>
+                <a:latin typeface="Lucida Console" panose="020B0609040504020204" pitchFamily="49" charset="0"/>
+              </a:rPr>
+              <a:t>sample estimates: cor 0.757878</a:t>
+            </a:r>
+          </a:p>
+        </p:txBody>
+      </p:sp>
+      <p:sp>
+        <p:nvSpPr>
+          <p:cNvPr id="33" name="Arrow: Curved Up 32">
+            <a:extLst>
+              <a:ext uri="{FF2B5EF4-FFF2-40B4-BE49-F238E27FC236}">
+                <a16:creationId xmlns:a16="http://schemas.microsoft.com/office/drawing/2014/main" id="{89FB3769-984D-4D80-8FCC-45FA6F39D09F}"/>
+              </a:ext>
+            </a:extLst>
+          </p:cNvPr>
+          <p:cNvSpPr/>
+          <p:nvPr/>
+        </p:nvSpPr>
+        <p:spPr>
+          <a:xfrm>
+            <a:off x="5943600" y="6475859"/>
+            <a:ext cx="2362200" cy="293790"/>
+          </a:xfrm>
+          <a:prstGeom prst="curvedUpArrow">
+            <a:avLst/>
+          </a:prstGeom>
+        </p:spPr>
+        <p:style>
+          <a:lnRef idx="2">
+            <a:schemeClr val="accent1">
+              <a:shade val="50000"/>
+            </a:schemeClr>
+          </a:lnRef>
+          <a:fillRef idx="1">
+            <a:schemeClr val="accent1"/>
+          </a:fillRef>
+          <a:effectRef idx="0">
+            <a:schemeClr val="accent1"/>
+          </a:effectRef>
+          <a:fontRef idx="minor">
+            <a:schemeClr val="lt1"/>
+          </a:fontRef>
+        </p:style>
+        <p:txBody>
+          <a:bodyPr rtlCol="0" anchor="ctr"/>
+          <a:lstStyle/>
+          <a:p>
+            <a:pPr algn="ctr"/>
+            <a:endParaRPr lang="en-US">
+              <a:solidFill>
+                <a:schemeClr val="tx1"/>
+              </a:solidFill>
+            </a:endParaRPr>
+          </a:p>
+        </p:txBody>
+      </p:sp>
+      <p:sp>
+        <p:nvSpPr>
+          <p:cNvPr id="34" name="Rectangle: Rounded Corners 33">
+            <a:extLst>
+              <a:ext uri="{FF2B5EF4-FFF2-40B4-BE49-F238E27FC236}">
+                <a16:creationId xmlns:a16="http://schemas.microsoft.com/office/drawing/2014/main" id="{0DD8C925-A1B5-4C4C-918E-8A023D09909F}"/>
+              </a:ext>
+            </a:extLst>
+          </p:cNvPr>
+          <p:cNvSpPr/>
+          <p:nvPr/>
+        </p:nvSpPr>
+        <p:spPr>
+          <a:xfrm>
+            <a:off x="5669169" y="6346153"/>
+            <a:ext cx="796272" cy="138415"/>
+          </a:xfrm>
+          <a:prstGeom prst="roundRect">
+            <a:avLst/>
+          </a:prstGeom>
+          <a:noFill/>
+        </p:spPr>
+        <p:style>
+          <a:lnRef idx="2">
+            <a:schemeClr val="accent1">
+              <a:shade val="50000"/>
+            </a:schemeClr>
+          </a:lnRef>
+          <a:fillRef idx="1">
+            <a:schemeClr val="accent1"/>
+          </a:fillRef>
+          <a:effectRef idx="0">
+            <a:schemeClr val="accent1"/>
+          </a:effectRef>
+          <a:fontRef idx="minor">
+            <a:schemeClr val="lt1"/>
+          </a:fontRef>
+        </p:style>
+        <p:txBody>
+          <a:bodyPr rtlCol="0" anchor="ctr"/>
+          <a:lstStyle/>
+          <a:p>
+            <a:pPr algn="ctr"/>
+            <a:endParaRPr lang="en-US"/>
+          </a:p>
+        </p:txBody>
+      </p:sp>
+      <p:sp>
+        <p:nvSpPr>
+          <p:cNvPr id="35" name="Rectangle: Rounded Corners 34">
+            <a:extLst>
+              <a:ext uri="{FF2B5EF4-FFF2-40B4-BE49-F238E27FC236}">
+                <a16:creationId xmlns:a16="http://schemas.microsoft.com/office/drawing/2014/main" id="{CCC0B083-F18C-452F-8B2E-1A41C43F1D71}"/>
+              </a:ext>
+            </a:extLst>
+          </p:cNvPr>
+          <p:cNvSpPr/>
+          <p:nvPr/>
+        </p:nvSpPr>
+        <p:spPr>
+          <a:xfrm>
+            <a:off x="8001686" y="6349066"/>
+            <a:ext cx="796272" cy="138415"/>
+          </a:xfrm>
+          <a:prstGeom prst="roundRect">
+            <a:avLst/>
+          </a:prstGeom>
+          <a:noFill/>
+        </p:spPr>
+        <p:style>
+          <a:lnRef idx="2">
+            <a:schemeClr val="accent1">
+              <a:shade val="50000"/>
+            </a:schemeClr>
+          </a:lnRef>
+          <a:fillRef idx="1">
+            <a:schemeClr val="accent1"/>
+          </a:fillRef>
+          <a:effectRef idx="0">
+            <a:schemeClr val="accent1"/>
+          </a:effectRef>
+          <a:fontRef idx="minor">
+            <a:schemeClr val="lt1"/>
+          </a:fontRef>
+        </p:style>
+        <p:txBody>
+          <a:bodyPr rtlCol="0" anchor="ctr"/>
+          <a:lstStyle/>
+          <a:p>
+            <a:pPr algn="ctr"/>
+            <a:endParaRPr lang="en-US"/>
+          </a:p>
+        </p:txBody>
+      </p:sp>
     </p:spTree>
     <p:extLst>
       <p:ext uri="{BB962C8B-B14F-4D97-AF65-F5344CB8AC3E}">
@@ -16690,47 +16915,4 @@
     </a:folHlink>
   </a:clrScheme>
 </a:themeOverride>
-</file>
-
-<file path=ppt/theme/themeOverride2.xml><?xml version="1.0" encoding="utf-8"?>
-<a:themeOverride xmlns:a="http://schemas.openxmlformats.org/drawingml/2006/main">
-  <a:clrScheme name="Parallax">
-    <a:dk1>
-      <a:sysClr val="windowText" lastClr="000000"/>
-    </a:dk1>
-    <a:lt1>
-      <a:sysClr val="window" lastClr="FFFFFF"/>
-    </a:lt1>
-    <a:dk2>
-      <a:srgbClr val="212121"/>
-    </a:dk2>
-    <a:lt2>
-      <a:srgbClr val="CDD0D1"/>
-    </a:lt2>
-    <a:accent1>
-      <a:srgbClr val="EB8F22"/>
-    </a:accent1>
-    <a:accent2>
-      <a:srgbClr val="CD4223"/>
-    </a:accent2>
-    <a:accent3>
-      <a:srgbClr val="A89374"/>
-    </a:accent3>
-    <a:accent4>
-      <a:srgbClr val="83AA67"/>
-    </a:accent4>
-    <a:accent5>
-      <a:srgbClr val="4FA9C1"/>
-    </a:accent5>
-    <a:accent6>
-      <a:srgbClr val="9390AF"/>
-    </a:accent6>
-    <a:hlink>
-      <a:srgbClr val="EC7220"/>
-    </a:hlink>
-    <a:folHlink>
-      <a:srgbClr val="F09355"/>
-    </a:folHlink>
-  </a:clrScheme>
-</a:themeOverride>
 </file>
</xml_diff>